<commit_message>
Update cells in model to be part of AB
</commit_message>
<xml_diff>
--- a/docs/diagrams/ModelComponentClassDiagram.pptx
+++ b/docs/diagrams/ModelComponentClassDiagram.pptx
@@ -208,7 +208,7 @@
           <a:p>
             <a:fld id="{F5CC4B3F-88C1-4FFA-B1B6-F41C21DC6924}" type="datetimeFigureOut">
               <a:rPr lang="en-US" smtClean="0"/>
-              <a:t>1/1/18</a:t>
+              <a:t>3/21/2018</a:t>
             </a:fld>
             <a:endParaRPr lang="en-US"/>
           </a:p>
@@ -657,7 +657,7 @@
           <a:p>
             <a:fld id="{78C97017-6FC3-485B-9764-EAC9E56C1D49}" type="datetimeFigureOut">
               <a:rPr lang="en-US" smtClean="0"/>
-              <a:t>1/1/18</a:t>
+              <a:t>3/21/2018</a:t>
             </a:fld>
             <a:endParaRPr lang="en-US"/>
           </a:p>
@@ -827,7 +827,7 @@
           <a:p>
             <a:fld id="{78C97017-6FC3-485B-9764-EAC9E56C1D49}" type="datetimeFigureOut">
               <a:rPr lang="en-US" smtClean="0"/>
-              <a:t>1/1/18</a:t>
+              <a:t>3/21/2018</a:t>
             </a:fld>
             <a:endParaRPr lang="en-US"/>
           </a:p>
@@ -1007,7 +1007,7 @@
           <a:p>
             <a:fld id="{78C97017-6FC3-485B-9764-EAC9E56C1D49}" type="datetimeFigureOut">
               <a:rPr lang="en-US" smtClean="0"/>
-              <a:t>1/1/18</a:t>
+              <a:t>3/21/2018</a:t>
             </a:fld>
             <a:endParaRPr lang="en-US"/>
           </a:p>
@@ -1177,7 +1177,7 @@
           <a:p>
             <a:fld id="{78C97017-6FC3-485B-9764-EAC9E56C1D49}" type="datetimeFigureOut">
               <a:rPr lang="en-US" smtClean="0"/>
-              <a:t>1/1/18</a:t>
+              <a:t>3/21/2018</a:t>
             </a:fld>
             <a:endParaRPr lang="en-US"/>
           </a:p>
@@ -1423,7 +1423,7 @@
           <a:p>
             <a:fld id="{78C97017-6FC3-485B-9764-EAC9E56C1D49}" type="datetimeFigureOut">
               <a:rPr lang="en-US" smtClean="0"/>
-              <a:t>1/1/18</a:t>
+              <a:t>3/21/2018</a:t>
             </a:fld>
             <a:endParaRPr lang="en-US"/>
           </a:p>
@@ -1711,7 +1711,7 @@
           <a:p>
             <a:fld id="{78C97017-6FC3-485B-9764-EAC9E56C1D49}" type="datetimeFigureOut">
               <a:rPr lang="en-US" smtClean="0"/>
-              <a:t>1/1/18</a:t>
+              <a:t>3/21/2018</a:t>
             </a:fld>
             <a:endParaRPr lang="en-US"/>
           </a:p>
@@ -2133,7 +2133,7 @@
           <a:p>
             <a:fld id="{78C97017-6FC3-485B-9764-EAC9E56C1D49}" type="datetimeFigureOut">
               <a:rPr lang="en-US" smtClean="0"/>
-              <a:t>1/1/18</a:t>
+              <a:t>3/21/2018</a:t>
             </a:fld>
             <a:endParaRPr lang="en-US"/>
           </a:p>
@@ -2251,7 +2251,7 @@
           <a:p>
             <a:fld id="{78C97017-6FC3-485B-9764-EAC9E56C1D49}" type="datetimeFigureOut">
               <a:rPr lang="en-US" smtClean="0"/>
-              <a:t>1/1/18</a:t>
+              <a:t>3/21/2018</a:t>
             </a:fld>
             <a:endParaRPr lang="en-US"/>
           </a:p>
@@ -2346,7 +2346,7 @@
           <a:p>
             <a:fld id="{78C97017-6FC3-485B-9764-EAC9E56C1D49}" type="datetimeFigureOut">
               <a:rPr lang="en-US" smtClean="0"/>
-              <a:t>1/1/18</a:t>
+              <a:t>3/21/2018</a:t>
             </a:fld>
             <a:endParaRPr lang="en-US"/>
           </a:p>
@@ -2623,7 +2623,7 @@
           <a:p>
             <a:fld id="{78C97017-6FC3-485B-9764-EAC9E56C1D49}" type="datetimeFigureOut">
               <a:rPr lang="en-US" smtClean="0"/>
-              <a:t>1/1/18</a:t>
+              <a:t>3/21/2018</a:t>
             </a:fld>
             <a:endParaRPr lang="en-US"/>
           </a:p>
@@ -2876,7 +2876,7 @@
           <a:p>
             <a:fld id="{78C97017-6FC3-485B-9764-EAC9E56C1D49}" type="datetimeFigureOut">
               <a:rPr lang="en-US" smtClean="0"/>
-              <a:t>1/1/18</a:t>
+              <a:t>3/21/2018</a:t>
             </a:fld>
             <a:endParaRPr lang="en-US"/>
           </a:p>
@@ -3089,7 +3089,7 @@
           <a:p>
             <a:fld id="{78C97017-6FC3-485B-9764-EAC9E56C1D49}" type="datetimeFigureOut">
               <a:rPr lang="en-US" smtClean="0"/>
-              <a:t>1/1/18</a:t>
+              <a:t>3/21/2018</a:t>
             </a:fld>
             <a:endParaRPr lang="en-US"/>
           </a:p>
@@ -4652,7 +4652,7 @@
         <p:spPr>
           <a:xfrm>
             <a:off x="7712397" y="2564238"/>
-            <a:ext cx="708186" cy="285783"/>
+            <a:ext cx="822002" cy="285783"/>
           </a:xfrm>
           <a:prstGeom prst="rect">
             <a:avLst/>
@@ -4796,7 +4796,7 @@
         <p:spPr>
           <a:xfrm>
             <a:off x="7712397" y="2887216"/>
-            <a:ext cx="708186" cy="285783"/>
+            <a:ext cx="822002" cy="285783"/>
           </a:xfrm>
           <a:prstGeom prst="rect">
             <a:avLst/>
@@ -4893,7 +4893,7 @@
         <p:spPr>
           <a:xfrm>
             <a:off x="7712397" y="3210194"/>
-            <a:ext cx="708186" cy="285783"/>
+            <a:ext cx="822002" cy="285783"/>
           </a:xfrm>
           <a:prstGeom prst="rect">
             <a:avLst/>
@@ -4990,7 +4990,7 @@
         <p:spPr>
           <a:xfrm>
             <a:off x="7712397" y="3533171"/>
-            <a:ext cx="708186" cy="285783"/>
+            <a:ext cx="822002" cy="285783"/>
           </a:xfrm>
           <a:prstGeom prst="rect">
             <a:avLst/>
@@ -5753,6 +5753,520 @@
           </a:p>
         </p:txBody>
       </p:sp>
+      <p:sp>
+        <p:nvSpPr>
+          <p:cNvPr id="73" name="Rectangle 8"/>
+          <p:cNvSpPr/>
+          <p:nvPr/>
+        </p:nvSpPr>
+        <p:spPr>
+          <a:xfrm>
+            <a:off x="4507235" y="4137581"/>
+            <a:ext cx="1156969" cy="346760"/>
+          </a:xfrm>
+          <a:prstGeom prst="rect">
+            <a:avLst/>
+          </a:prstGeom>
+          <a:ln w="19050">
+            <a:solidFill>
+              <a:srgbClr val="7030A0"/>
+            </a:solidFill>
+          </a:ln>
+          <a:effectLst/>
+        </p:spPr>
+        <p:style>
+          <a:lnRef idx="1">
+            <a:schemeClr val="accent4"/>
+          </a:lnRef>
+          <a:fillRef idx="2">
+            <a:schemeClr val="accent4"/>
+          </a:fillRef>
+          <a:effectRef idx="1">
+            <a:schemeClr val="accent4"/>
+          </a:effectRef>
+          <a:fontRef idx="minor">
+            <a:schemeClr val="dk1"/>
+          </a:fontRef>
+        </p:style>
+        <p:txBody>
+          <a:bodyPr rtlCol="0" anchor="ctr"/>
+          <a:lstStyle/>
+          <a:p>
+            <a:pPr algn="ctr"/>
+            <a:r>
+              <a:rPr lang="en-US" sz="1050" dirty="0" err="1" smtClean="0">
+                <a:solidFill>
+                  <a:srgbClr val="7030A0"/>
+                </a:solidFill>
+              </a:rPr>
+              <a:t>CellMap</a:t>
+            </a:r>
+            <a:endParaRPr lang="en-SG" sz="1050" dirty="0">
+              <a:solidFill>
+                <a:srgbClr val="7030A0"/>
+              </a:solidFill>
+            </a:endParaRPr>
+          </a:p>
+        </p:txBody>
+      </p:sp>
+      <p:cxnSp>
+        <p:nvCxnSpPr>
+          <p:cNvPr id="74" name="Elbow Connector 73"/>
+          <p:cNvCxnSpPr>
+            <a:stCxn id="51" idx="3"/>
+            <a:endCxn id="73" idx="1"/>
+          </p:cNvCxnSpPr>
+          <p:nvPr/>
+        </p:nvCxnSpPr>
+        <p:spPr>
+          <a:xfrm>
+            <a:off x="4220351" y="2760681"/>
+            <a:ext cx="286884" cy="1550280"/>
+          </a:xfrm>
+          <a:prstGeom prst="bentConnector3">
+            <a:avLst/>
+          </a:prstGeom>
+          <a:ln w="19050">
+            <a:solidFill>
+              <a:srgbClr val="7030A0"/>
+            </a:solidFill>
+            <a:headEnd type="none" w="med" len="med"/>
+            <a:tailEnd type="arrow" w="med" len="med"/>
+          </a:ln>
+          <a:effectLst/>
+        </p:spPr>
+        <p:style>
+          <a:lnRef idx="1">
+            <a:schemeClr val="accent2"/>
+          </a:lnRef>
+          <a:fillRef idx="2">
+            <a:schemeClr val="accent2"/>
+          </a:fillRef>
+          <a:effectRef idx="1">
+            <a:schemeClr val="accent2"/>
+          </a:effectRef>
+          <a:fontRef idx="minor">
+            <a:schemeClr val="dk1"/>
+          </a:fontRef>
+        </p:style>
+      </p:cxnSp>
+      <p:sp>
+        <p:nvSpPr>
+          <p:cNvPr id="77" name="Rectangle 8"/>
+          <p:cNvSpPr/>
+          <p:nvPr/>
+        </p:nvSpPr>
+        <p:spPr>
+          <a:xfrm>
+            <a:off x="6335278" y="4155149"/>
+            <a:ext cx="708186" cy="346760"/>
+          </a:xfrm>
+          <a:prstGeom prst="rect">
+            <a:avLst/>
+          </a:prstGeom>
+          <a:ln w="19050">
+            <a:solidFill>
+              <a:srgbClr val="7030A0"/>
+            </a:solidFill>
+          </a:ln>
+          <a:effectLst/>
+        </p:spPr>
+        <p:style>
+          <a:lnRef idx="1">
+            <a:schemeClr val="accent4"/>
+          </a:lnRef>
+          <a:fillRef idx="2">
+            <a:schemeClr val="accent4"/>
+          </a:fillRef>
+          <a:effectRef idx="1">
+            <a:schemeClr val="accent4"/>
+          </a:effectRef>
+          <a:fontRef idx="minor">
+            <a:schemeClr val="dk1"/>
+          </a:fontRef>
+        </p:style>
+        <p:txBody>
+          <a:bodyPr rtlCol="0" anchor="ctr"/>
+          <a:lstStyle/>
+          <a:p>
+            <a:pPr algn="ctr"/>
+            <a:r>
+              <a:rPr lang="en-US" sz="1050" dirty="0" smtClean="0">
+                <a:solidFill>
+                  <a:srgbClr val="7030A0"/>
+                </a:solidFill>
+              </a:rPr>
+              <a:t>Cell</a:t>
+            </a:r>
+            <a:endParaRPr lang="en-SG" sz="1050" dirty="0">
+              <a:solidFill>
+                <a:srgbClr val="7030A0"/>
+              </a:solidFill>
+            </a:endParaRPr>
+          </a:p>
+        </p:txBody>
+      </p:sp>
+      <p:sp>
+        <p:nvSpPr>
+          <p:cNvPr id="82" name="Flowchart: Decision 96"/>
+          <p:cNvSpPr/>
+          <p:nvPr/>
+        </p:nvSpPr>
+        <p:spPr>
+          <a:xfrm>
+            <a:off x="5664828" y="4241062"/>
+            <a:ext cx="236048" cy="173380"/>
+          </a:xfrm>
+          <a:prstGeom prst="flowChartDecision">
+            <a:avLst/>
+          </a:prstGeom>
+          <a:noFill/>
+          <a:ln w="19050">
+            <a:solidFill>
+              <a:srgbClr val="7030A0"/>
+            </a:solidFill>
+          </a:ln>
+          <a:effectLst/>
+        </p:spPr>
+        <p:style>
+          <a:lnRef idx="1">
+            <a:schemeClr val="accent6"/>
+          </a:lnRef>
+          <a:fillRef idx="2">
+            <a:schemeClr val="accent6"/>
+          </a:fillRef>
+          <a:effectRef idx="1">
+            <a:schemeClr val="accent6"/>
+          </a:effectRef>
+          <a:fontRef idx="minor">
+            <a:schemeClr val="dk1"/>
+          </a:fontRef>
+        </p:style>
+        <p:txBody>
+          <a:bodyPr rtlCol="0" anchor="ctr"/>
+          <a:lstStyle/>
+          <a:p>
+            <a:pPr algn="ctr"/>
+            <a:endParaRPr lang="en-US" sz="1050"/>
+          </a:p>
+        </p:txBody>
+      </p:sp>
+      <p:cxnSp>
+        <p:nvCxnSpPr>
+          <p:cNvPr id="87" name="Elbow Connector 86"/>
+          <p:cNvCxnSpPr>
+            <a:stCxn id="82" idx="3"/>
+            <a:endCxn id="77" idx="1"/>
+          </p:cNvCxnSpPr>
+          <p:nvPr/>
+        </p:nvCxnSpPr>
+        <p:spPr>
+          <a:xfrm>
+            <a:off x="5900876" y="4327752"/>
+            <a:ext cx="434402" cy="777"/>
+          </a:xfrm>
+          <a:prstGeom prst="bentConnector3">
+            <a:avLst/>
+          </a:prstGeom>
+          <a:ln w="19050">
+            <a:solidFill>
+              <a:srgbClr val="7030A0"/>
+            </a:solidFill>
+            <a:headEnd type="none" w="med" len="med"/>
+            <a:tailEnd type="arrow" w="med" len="med"/>
+          </a:ln>
+          <a:effectLst/>
+        </p:spPr>
+        <p:style>
+          <a:lnRef idx="1">
+            <a:schemeClr val="accent2"/>
+          </a:lnRef>
+          <a:fillRef idx="2">
+            <a:schemeClr val="accent2"/>
+          </a:fillRef>
+          <a:effectRef idx="1">
+            <a:schemeClr val="accent2"/>
+          </a:effectRef>
+          <a:fontRef idx="minor">
+            <a:schemeClr val="dk1"/>
+          </a:fontRef>
+        </p:style>
+      </p:cxnSp>
+      <p:sp>
+        <p:nvSpPr>
+          <p:cNvPr id="88" name="TextBox 87"/>
+          <p:cNvSpPr txBox="1"/>
+          <p:nvPr/>
+        </p:nvSpPr>
+        <p:spPr>
+          <a:xfrm>
+            <a:off x="6156857" y="4395000"/>
+            <a:ext cx="189257" cy="178683"/>
+          </a:xfrm>
+          <a:prstGeom prst="rect">
+            <a:avLst/>
+          </a:prstGeom>
+          <a:noFill/>
+        </p:spPr>
+        <p:txBody>
+          <a:bodyPr wrap="square" lIns="0" tIns="0" rIns="0" bIns="0" rtlCol="0">
+            <a:noAutofit/>
+          </a:bodyPr>
+          <a:lstStyle/>
+          <a:p>
+            <a:pPr algn="ctr"/>
+            <a:r>
+              <a:rPr lang="en-SG" sz="1100" dirty="0">
+                <a:solidFill>
+                  <a:srgbClr val="7030A0"/>
+                </a:solidFill>
+              </a:rPr>
+              <a:t>*</a:t>
+            </a:r>
+          </a:p>
+        </p:txBody>
+      </p:sp>
+      <p:sp>
+        <p:nvSpPr>
+          <p:cNvPr id="89" name="Flowchart: Decision 96"/>
+          <p:cNvSpPr/>
+          <p:nvPr/>
+        </p:nvSpPr>
+        <p:spPr>
+          <a:xfrm>
+            <a:off x="7041947" y="4245679"/>
+            <a:ext cx="236048" cy="173380"/>
+          </a:xfrm>
+          <a:prstGeom prst="flowChartDecision">
+            <a:avLst/>
+          </a:prstGeom>
+          <a:solidFill>
+            <a:srgbClr val="7030A0"/>
+          </a:solidFill>
+          <a:ln w="19050">
+            <a:solidFill>
+              <a:srgbClr val="7030A0"/>
+            </a:solidFill>
+          </a:ln>
+          <a:effectLst/>
+        </p:spPr>
+        <p:style>
+          <a:lnRef idx="1">
+            <a:schemeClr val="accent6"/>
+          </a:lnRef>
+          <a:fillRef idx="2">
+            <a:schemeClr val="accent6"/>
+          </a:fillRef>
+          <a:effectRef idx="1">
+            <a:schemeClr val="accent6"/>
+          </a:effectRef>
+          <a:fontRef idx="minor">
+            <a:schemeClr val="dk1"/>
+          </a:fontRef>
+        </p:style>
+        <p:txBody>
+          <a:bodyPr rtlCol="0" anchor="ctr"/>
+          <a:lstStyle/>
+          <a:p>
+            <a:pPr algn="ctr"/>
+            <a:endParaRPr lang="en-US" sz="1050"/>
+          </a:p>
+        </p:txBody>
+      </p:sp>
+      <p:sp>
+        <p:nvSpPr>
+          <p:cNvPr id="90" name="Rectangle 8"/>
+          <p:cNvSpPr/>
+          <p:nvPr/>
+        </p:nvSpPr>
+        <p:spPr>
+          <a:xfrm>
+            <a:off x="7712397" y="4012257"/>
+            <a:ext cx="822002" cy="285783"/>
+          </a:xfrm>
+          <a:prstGeom prst="rect">
+            <a:avLst/>
+          </a:prstGeom>
+          <a:ln w="19050">
+            <a:solidFill>
+              <a:srgbClr val="7030A0"/>
+            </a:solidFill>
+          </a:ln>
+          <a:effectLst/>
+        </p:spPr>
+        <p:style>
+          <a:lnRef idx="1">
+            <a:schemeClr val="accent4"/>
+          </a:lnRef>
+          <a:fillRef idx="2">
+            <a:schemeClr val="accent4"/>
+          </a:fillRef>
+          <a:effectRef idx="1">
+            <a:schemeClr val="accent4"/>
+          </a:effectRef>
+          <a:fontRef idx="minor">
+            <a:schemeClr val="dk1"/>
+          </a:fontRef>
+        </p:style>
+        <p:txBody>
+          <a:bodyPr rtlCol="0" anchor="ctr"/>
+          <a:lstStyle/>
+          <a:p>
+            <a:pPr algn="ctr"/>
+            <a:r>
+              <a:rPr lang="en-US" sz="1050" dirty="0" smtClean="0">
+                <a:solidFill>
+                  <a:srgbClr val="7030A0"/>
+                </a:solidFill>
+              </a:rPr>
+              <a:t>Prisoner</a:t>
+            </a:r>
+            <a:endParaRPr lang="en-SG" sz="1050" dirty="0">
+              <a:solidFill>
+                <a:srgbClr val="7030A0"/>
+              </a:solidFill>
+            </a:endParaRPr>
+          </a:p>
+        </p:txBody>
+      </p:sp>
+      <p:cxnSp>
+        <p:nvCxnSpPr>
+          <p:cNvPr id="91" name="Elbow Connector 90"/>
+          <p:cNvCxnSpPr>
+            <a:stCxn id="89" idx="3"/>
+            <a:endCxn id="90" idx="1"/>
+          </p:cNvCxnSpPr>
+          <p:nvPr/>
+        </p:nvCxnSpPr>
+        <p:spPr>
+          <a:xfrm flipV="1">
+            <a:off x="7277995" y="4155149"/>
+            <a:ext cx="434402" cy="177220"/>
+          </a:xfrm>
+          <a:prstGeom prst="bentConnector3">
+            <a:avLst/>
+          </a:prstGeom>
+          <a:ln w="19050">
+            <a:solidFill>
+              <a:srgbClr val="7030A0"/>
+            </a:solidFill>
+            <a:headEnd type="none" w="med" len="med"/>
+            <a:tailEnd type="arrow" w="med" len="med"/>
+          </a:ln>
+          <a:effectLst/>
+        </p:spPr>
+        <p:style>
+          <a:lnRef idx="1">
+            <a:schemeClr val="accent2"/>
+          </a:lnRef>
+          <a:fillRef idx="2">
+            <a:schemeClr val="accent2"/>
+          </a:fillRef>
+          <a:effectRef idx="1">
+            <a:schemeClr val="accent2"/>
+          </a:effectRef>
+          <a:fontRef idx="minor">
+            <a:schemeClr val="dk1"/>
+          </a:fontRef>
+        </p:style>
+      </p:cxnSp>
+      <p:sp>
+        <p:nvSpPr>
+          <p:cNvPr id="92" name="Rectangle 8"/>
+          <p:cNvSpPr/>
+          <p:nvPr/>
+        </p:nvSpPr>
+        <p:spPr>
+          <a:xfrm>
+            <a:off x="7712396" y="4335234"/>
+            <a:ext cx="822003" cy="285783"/>
+          </a:xfrm>
+          <a:prstGeom prst="rect">
+            <a:avLst/>
+          </a:prstGeom>
+          <a:ln w="19050">
+            <a:solidFill>
+              <a:srgbClr val="7030A0"/>
+            </a:solidFill>
+          </a:ln>
+          <a:effectLst/>
+        </p:spPr>
+        <p:style>
+          <a:lnRef idx="1">
+            <a:schemeClr val="accent4"/>
+          </a:lnRef>
+          <a:fillRef idx="2">
+            <a:schemeClr val="accent4"/>
+          </a:fillRef>
+          <a:effectRef idx="1">
+            <a:schemeClr val="accent4"/>
+          </a:effectRef>
+          <a:fontRef idx="minor">
+            <a:schemeClr val="dk1"/>
+          </a:fontRef>
+        </p:style>
+        <p:txBody>
+          <a:bodyPr rtlCol="0" anchor="ctr"/>
+          <a:lstStyle/>
+          <a:p>
+            <a:pPr algn="ctr"/>
+            <a:r>
+              <a:rPr lang="en-US" sz="1050" dirty="0" err="1" smtClean="0">
+                <a:solidFill>
+                  <a:srgbClr val="7030A0"/>
+                </a:solidFill>
+              </a:rPr>
+              <a:t>CellAddress</a:t>
+            </a:r>
+            <a:endParaRPr lang="en-SG" sz="1050" dirty="0">
+              <a:solidFill>
+                <a:srgbClr val="7030A0"/>
+              </a:solidFill>
+            </a:endParaRPr>
+          </a:p>
+        </p:txBody>
+      </p:sp>
+      <p:cxnSp>
+        <p:nvCxnSpPr>
+          <p:cNvPr id="93" name="Elbow Connector 92"/>
+          <p:cNvCxnSpPr>
+            <a:stCxn id="89" idx="3"/>
+            <a:endCxn id="92" idx="1"/>
+          </p:cNvCxnSpPr>
+          <p:nvPr/>
+        </p:nvCxnSpPr>
+        <p:spPr>
+          <a:xfrm>
+            <a:off x="7277995" y="4332369"/>
+            <a:ext cx="434401" cy="145757"/>
+          </a:xfrm>
+          <a:prstGeom prst="bentConnector3">
+            <a:avLst/>
+          </a:prstGeom>
+          <a:ln w="19050">
+            <a:solidFill>
+              <a:srgbClr val="7030A0"/>
+            </a:solidFill>
+            <a:headEnd type="none" w="med" len="med"/>
+            <a:tailEnd type="arrow" w="med" len="med"/>
+          </a:ln>
+          <a:effectLst/>
+        </p:spPr>
+        <p:style>
+          <a:lnRef idx="1">
+            <a:schemeClr val="accent2"/>
+          </a:lnRef>
+          <a:fillRef idx="2">
+            <a:schemeClr val="accent2"/>
+          </a:fillRef>
+          <a:effectRef idx="1">
+            <a:schemeClr val="accent2"/>
+          </a:effectRef>
+          <a:fontRef idx="minor">
+            <a:schemeClr val="dk1"/>
+          </a:fontRef>
+        </p:style>
+      </p:cxnSp>
     </p:spTree>
     <p:extLst>
       <p:ext uri="{BB962C8B-B14F-4D97-AF65-F5344CB8AC3E}">

</xml_diff>